<commit_message>
Update Project Proposal Presentation Verena.pptx
</commit_message>
<xml_diff>
--- a/Presentations/Project Proposal/Project Proposal Presentation Verena.pptx
+++ b/Presentations/Project Proposal/Project Proposal Presentation Verena.pptx
@@ -225,7 +225,7 @@
           <a:p>
             <a:fld id="{A066BCB4-5747-4B09-964D-B3729956D23A}" type="datetimeFigureOut">
               <a:rPr lang="de-DE" smtClean="0"/>
-              <a:t>17.05.2022</a:t>
+              <a:t>18.05.2022</a:t>
             </a:fld>
             <a:endParaRPr lang="de-DE"/>
           </a:p>
@@ -1154,7 +1154,15 @@
             </a:r>
             <a:r>
               <a:rPr lang="en-US" dirty="0"/>
-              <a:t> of July. Phase five will be used to take all necessary steps to conclude this project. We will compile all relevant data into a report and prepare a final presentation. This will be used to present all our gained knowledge to you.</a:t>
+              <a:t> of July. Phase five will be used to take all necessary steps to conclude this project. We will compile all relevant data into a report and prepare a final presentation. This will be used to present all our gained knowledge to you. This last Phase will end on the 19</a:t>
+            </a:r>
+            <a:r>
+              <a:rPr lang="en-US" baseline="30000" dirty="0"/>
+              <a:t>th</a:t>
+            </a:r>
+            <a:r>
+              <a:rPr lang="en-US" dirty="0"/>
+              <a:t> of July, just one day before we will conclude this project by holding our final presentation.</a:t>
             </a:r>
           </a:p>
           <a:p>
@@ -1308,8 +1316,13 @@
             </a:r>
             <a:r>
               <a:rPr lang="en-US" dirty="0"/>
-              <a:t>. The round table. Every Tuesday evening at five pm we meet at a conference room in the library and hold our weeks main meeting. This includes an in-depth discussion of our tutorial with Ian earlier in the day and a further exploring of our further developed ideas from the tutorial debriefing. We also recap what we achieved in the last week and distribute tasks for the coming weeks. </a:t>
-            </a:r>
+              <a:t>. The round table. Every Tuesday evening at five pm we meet at a conference room in the library and hold our weeks main meeting. This includes an in-depth discussion of our tutorial with Ian earlier in the day and exploring of our further developed ideas from the tutorial debriefing. We also recap what we achieved in the last week and distribute tasks for the </a:t>
+            </a:r>
+            <a:r>
+              <a:rPr lang="en-US"/>
+              <a:t>coming week. </a:t>
+            </a:r>
+            <a:endParaRPr lang="en-US" dirty="0"/>
           </a:p>
           <a:p>
             <a:r>
@@ -5229,7 +5242,7 @@
           <a:p>
             <a:fld id="{4E4D35B4-7069-4B30-92CD-0AEC62722384}" type="datetime1">
               <a:rPr lang="de-DE" smtClean="0"/>
-              <a:t>17.05.2022</a:t>
+              <a:t>18.05.2022</a:t>
             </a:fld>
             <a:endParaRPr lang="de-DE"/>
           </a:p>
@@ -5402,7 +5415,7 @@
           <a:p>
             <a:fld id="{EF11B494-B548-4041-8C78-F3F11B2153ED}" type="datetime1">
               <a:rPr lang="de-DE" smtClean="0"/>
-              <a:t>17.05.2022</a:t>
+              <a:t>18.05.2022</a:t>
             </a:fld>
             <a:endParaRPr lang="de-DE"/>
           </a:p>
@@ -5585,7 +5598,7 @@
           <a:p>
             <a:fld id="{D34EC744-8E0F-4666-BC5A-495C368D8BA0}" type="datetime1">
               <a:rPr lang="de-DE" smtClean="0"/>
-              <a:t>17.05.2022</a:t>
+              <a:t>18.05.2022</a:t>
             </a:fld>
             <a:endParaRPr lang="de-DE"/>
           </a:p>
@@ -5758,7 +5771,7 @@
           <a:p>
             <a:fld id="{1F96605B-8219-405C-BAB3-22CFB93EC77D}" type="datetime1">
               <a:rPr lang="de-DE" smtClean="0"/>
-              <a:t>17.05.2022</a:t>
+              <a:t>18.05.2022</a:t>
             </a:fld>
             <a:endParaRPr lang="de-DE"/>
           </a:p>
@@ -6007,7 +6020,7 @@
           <a:p>
             <a:fld id="{B8870600-3A68-4AB7-9141-BAD48B0D6406}" type="datetime1">
               <a:rPr lang="de-DE" smtClean="0"/>
-              <a:t>17.05.2022</a:t>
+              <a:t>18.05.2022</a:t>
             </a:fld>
             <a:endParaRPr lang="de-DE"/>
           </a:p>
@@ -6242,7 +6255,7 @@
           <a:p>
             <a:fld id="{5FD8DBC4-4E8B-4F2E-8D75-B3D601992F13}" type="datetime1">
               <a:rPr lang="de-DE" smtClean="0"/>
-              <a:t>17.05.2022</a:t>
+              <a:t>18.05.2022</a:t>
             </a:fld>
             <a:endParaRPr lang="de-DE"/>
           </a:p>
@@ -6612,7 +6625,7 @@
           <a:p>
             <a:fld id="{E38F780F-35A8-41F2-803D-8DFD54272BEF}" type="datetime1">
               <a:rPr lang="de-DE" smtClean="0"/>
-              <a:t>17.05.2022</a:t>
+              <a:t>18.05.2022</a:t>
             </a:fld>
             <a:endParaRPr lang="de-DE"/>
           </a:p>
@@ -6733,7 +6746,7 @@
           <a:p>
             <a:fld id="{E248A22B-5891-4BB7-B577-825EF80C8DC0}" type="datetime1">
               <a:rPr lang="de-DE" smtClean="0"/>
-              <a:t>17.05.2022</a:t>
+              <a:t>18.05.2022</a:t>
             </a:fld>
             <a:endParaRPr lang="de-DE"/>
           </a:p>
@@ -6831,7 +6844,7 @@
           <a:p>
             <a:fld id="{EBAB5F03-E438-409F-948A-23B68EC68711}" type="datetime1">
               <a:rPr lang="de-DE" smtClean="0"/>
-              <a:t>17.05.2022</a:t>
+              <a:t>18.05.2022</a:t>
             </a:fld>
             <a:endParaRPr lang="de-DE"/>
           </a:p>
@@ -7111,7 +7124,7 @@
           <a:p>
             <a:fld id="{189EC830-2B5C-4E75-B244-C97623B20C7C}" type="datetime1">
               <a:rPr lang="de-DE" smtClean="0"/>
-              <a:t>17.05.2022</a:t>
+              <a:t>18.05.2022</a:t>
             </a:fld>
             <a:endParaRPr lang="de-DE"/>
           </a:p>
@@ -7371,7 +7384,7 @@
           <a:p>
             <a:fld id="{B68E9873-F58D-4E9C-B2A6-B07C00CC07F2}" type="datetime1">
               <a:rPr lang="de-DE" smtClean="0"/>
-              <a:t>17.05.2022</a:t>
+              <a:t>18.05.2022</a:t>
             </a:fld>
             <a:endParaRPr lang="de-DE"/>
           </a:p>
@@ -7587,7 +7600,7 @@
           <a:p>
             <a:fld id="{108A87E1-5614-4AB1-8F63-E303A46FF430}" type="datetime1">
               <a:rPr lang="de-DE" smtClean="0"/>
-              <a:t>17.05.2022</a:t>
+              <a:t>18.05.2022</a:t>
             </a:fld>
             <a:endParaRPr lang="de-DE"/>
           </a:p>
@@ -8071,7 +8084,7 @@
                 <a:tabLst/>
                 <a:defRPr/>
               </a:pPr>
-              <a:t>17.05.2022</a:t>
+              <a:t>18.05.2022</a:t>
             </a:fld>
             <a:endParaRPr kumimoji="0" lang="de-DE" sz="900" b="0" i="0" u="none" strike="noStrike" kern="1200" cap="none" spc="0" normalizeH="0" baseline="0" noProof="0" dirty="0">
               <a:ln>
@@ -8954,7 +8967,7 @@
                   <a:srgbClr val="2E4186"/>
                 </a:solidFill>
               </a:rPr>
-              <a:t>17.05.2022</a:t>
+              <a:t>18.05.2022</a:t>
             </a:fld>
             <a:endParaRPr lang="de-DE" dirty="0">
               <a:solidFill>
@@ -9867,7 +9880,7 @@
                   <a:srgbClr val="2E4186"/>
                 </a:solidFill>
               </a:rPr>
-              <a:t>17.05.2022</a:t>
+              <a:t>18.05.2022</a:t>
             </a:fld>
             <a:endParaRPr lang="de-DE" dirty="0">
               <a:solidFill>
@@ -11243,7 +11256,7 @@
                   <a:srgbClr val="2E4186"/>
                 </a:solidFill>
               </a:rPr>
-              <a:t>17.05.2022</a:t>
+              <a:t>18.05.2022</a:t>
             </a:fld>
             <a:endParaRPr lang="de-DE" dirty="0">
               <a:solidFill>
@@ -16835,7 +16848,7 @@
                   <a:srgbClr val="2E4186"/>
                 </a:solidFill>
               </a:rPr>
-              <a:t>17.05.2022</a:t>
+              <a:t>18.05.2022</a:t>
             </a:fld>
             <a:endParaRPr lang="de-DE" dirty="0">
               <a:solidFill>
@@ -17817,7 +17830,7 @@
                                 </p:cTn>
                               </p:par>
                               <p:par>
-                                <p:cTn id="7" presetID="1" presetClass="exit" presetSubtype="0" fill="hold" nodeType="withEffect">
+                                <p:cTn id="7" presetID="10" presetClass="entr" presetSubtype="0" fill="hold" grpId="0" nodeType="withEffect">
                                   <p:stCondLst>
                                     <p:cond delay="0"/>
                                   </p:stCondLst>
@@ -17825,6 +17838,41 @@
                                     <p:set>
                                       <p:cBhvr>
                                         <p:cTn id="8" dur="1" fill="hold">
+                                          <p:stCondLst>
+                                            <p:cond delay="0"/>
+                                          </p:stCondLst>
+                                        </p:cTn>
+                                        <p:tgtEl>
+                                          <p:spTgt spid="38"/>
+                                        </p:tgtEl>
+                                        <p:attrNameLst>
+                                          <p:attrName>style.visibility</p:attrName>
+                                        </p:attrNameLst>
+                                      </p:cBhvr>
+                                      <p:to>
+                                        <p:strVal val="visible"/>
+                                      </p:to>
+                                    </p:set>
+                                    <p:animEffect transition="in" filter="fade">
+                                      <p:cBhvr>
+                                        <p:cTn id="9" dur="500"/>
+                                        <p:tgtEl>
+                                          <p:spTgt spid="38"/>
+                                        </p:tgtEl>
+                                      </p:cBhvr>
+                                    </p:animEffect>
+                                  </p:childTnLst>
+                                </p:cTn>
+                              </p:par>
+                              <p:par>
+                                <p:cTn id="10" presetID="1" presetClass="exit" presetSubtype="0" fill="hold" nodeType="withEffect">
+                                  <p:stCondLst>
+                                    <p:cond delay="0"/>
+                                  </p:stCondLst>
+                                  <p:childTnLst>
+                                    <p:set>
+                                      <p:cBhvr>
+                                        <p:cTn id="11" dur="1" fill="hold">
                                           <p:stCondLst>
                                             <p:cond delay="0"/>
                                           </p:stCondLst>
@@ -17850,26 +17898,26 @@
                     </p:cTn>
                   </p:par>
                   <p:par>
-                    <p:cTn id="9" fill="hold">
+                    <p:cTn id="12" fill="hold">
                       <p:stCondLst>
                         <p:cond delay="indefinite"/>
                       </p:stCondLst>
                       <p:childTnLst>
                         <p:par>
-                          <p:cTn id="10" fill="hold">
+                          <p:cTn id="13" fill="hold">
                             <p:stCondLst>
                               <p:cond delay="0"/>
                             </p:stCondLst>
                             <p:childTnLst>
                               <p:par>
-                                <p:cTn id="11" presetID="1" presetClass="exit" presetSubtype="0" fill="hold" nodeType="clickEffect">
+                                <p:cTn id="14" presetID="1" presetClass="exit" presetSubtype="0" fill="hold" nodeType="clickEffect">
                                   <p:stCondLst>
                                     <p:cond delay="0"/>
                                   </p:stCondLst>
                                   <p:childTnLst>
                                     <p:set>
                                       <p:cBhvr>
-                                        <p:cTn id="12" dur="1" fill="hold">
+                                        <p:cTn id="15" dur="1" fill="hold">
                                           <p:stCondLst>
                                             <p:cond delay="0"/>
                                           </p:stCondLst>
@@ -17889,14 +17937,14 @@
                                 </p:cTn>
                               </p:par>
                               <p:par>
-                                <p:cTn id="13" presetID="1" presetClass="entr" presetSubtype="0" fill="hold" nodeType="withEffect">
+                                <p:cTn id="16" presetID="1" presetClass="entr" presetSubtype="0" fill="hold" nodeType="withEffect">
                                   <p:stCondLst>
                                     <p:cond delay="0"/>
                                   </p:stCondLst>
                                   <p:childTnLst>
                                     <p:set>
                                       <p:cBhvr>
-                                        <p:cTn id="14" dur="1" fill="hold">
+                                        <p:cTn id="17" dur="1" fill="hold">
                                           <p:stCondLst>
                                             <p:cond delay="0"/>
                                           </p:stCondLst>
@@ -17916,14 +17964,49 @@
                                 </p:cTn>
                               </p:par>
                               <p:par>
-                                <p:cTn id="15" presetID="1" presetClass="entr" presetSubtype="0" fill="hold" nodeType="withEffect">
+                                <p:cTn id="18" presetID="10" presetClass="entr" presetSubtype="0" fill="hold" grpId="0" nodeType="withEffect">
                                   <p:stCondLst>
                                     <p:cond delay="0"/>
                                   </p:stCondLst>
                                   <p:childTnLst>
                                     <p:set>
                                       <p:cBhvr>
-                                        <p:cTn id="16" dur="1" fill="hold">
+                                        <p:cTn id="19" dur="1" fill="hold">
+                                          <p:stCondLst>
+                                            <p:cond delay="0"/>
+                                          </p:stCondLst>
+                                        </p:cTn>
+                                        <p:tgtEl>
+                                          <p:spTgt spid="40"/>
+                                        </p:tgtEl>
+                                        <p:attrNameLst>
+                                          <p:attrName>style.visibility</p:attrName>
+                                        </p:attrNameLst>
+                                      </p:cBhvr>
+                                      <p:to>
+                                        <p:strVal val="visible"/>
+                                      </p:to>
+                                    </p:set>
+                                    <p:animEffect transition="in" filter="fade">
+                                      <p:cBhvr>
+                                        <p:cTn id="20" dur="500"/>
+                                        <p:tgtEl>
+                                          <p:spTgt spid="40"/>
+                                        </p:tgtEl>
+                                      </p:cBhvr>
+                                    </p:animEffect>
+                                  </p:childTnLst>
+                                </p:cTn>
+                              </p:par>
+                              <p:par>
+                                <p:cTn id="21" presetID="1" presetClass="entr" presetSubtype="0" fill="hold" nodeType="withEffect">
+                                  <p:stCondLst>
+                                    <p:cond delay="0"/>
+                                  </p:stCondLst>
+                                  <p:childTnLst>
+                                    <p:set>
+                                      <p:cBhvr>
+                                        <p:cTn id="22" dur="1" fill="hold">
                                           <p:stCondLst>
                                             <p:cond delay="0"/>
                                           </p:stCondLst>
@@ -17943,14 +18026,14 @@
                                 </p:cTn>
                               </p:par>
                               <p:par>
-                                <p:cTn id="17" presetID="1" presetClass="exit" presetSubtype="0" fill="hold" nodeType="withEffect">
+                                <p:cTn id="23" presetID="1" presetClass="exit" presetSubtype="0" fill="hold" nodeType="withEffect">
                                   <p:stCondLst>
                                     <p:cond delay="0"/>
                                   </p:stCondLst>
                                   <p:childTnLst>
                                     <p:set>
                                       <p:cBhvr>
-                                        <p:cTn id="18" dur="1" fill="hold">
+                                        <p:cTn id="24" dur="1" fill="hold">
                                           <p:stCondLst>
                                             <p:cond delay="0"/>
                                           </p:stCondLst>
@@ -17976,26 +18059,26 @@
                     </p:cTn>
                   </p:par>
                   <p:par>
-                    <p:cTn id="19" fill="hold">
+                    <p:cTn id="25" fill="hold">
                       <p:stCondLst>
                         <p:cond delay="indefinite"/>
                       </p:stCondLst>
                       <p:childTnLst>
                         <p:par>
-                          <p:cTn id="20" fill="hold">
+                          <p:cTn id="26" fill="hold">
                             <p:stCondLst>
                               <p:cond delay="0"/>
                             </p:stCondLst>
                             <p:childTnLst>
                               <p:par>
-                                <p:cTn id="21" presetID="1" presetClass="exit" presetSubtype="0" fill="hold" nodeType="clickEffect">
+                                <p:cTn id="27" presetID="1" presetClass="exit" presetSubtype="0" fill="hold" nodeType="clickEffect">
                                   <p:stCondLst>
                                     <p:cond delay="0"/>
                                   </p:stCondLst>
                                   <p:childTnLst>
                                     <p:set>
                                       <p:cBhvr>
-                                        <p:cTn id="22" dur="1" fill="hold">
+                                        <p:cTn id="28" dur="1" fill="hold">
                                           <p:stCondLst>
                                             <p:cond delay="0"/>
                                           </p:stCondLst>
@@ -18015,14 +18098,14 @@
                                 </p:cTn>
                               </p:par>
                               <p:par>
-                                <p:cTn id="23" presetID="1" presetClass="entr" presetSubtype="0" fill="hold" nodeType="withEffect">
+                                <p:cTn id="29" presetID="1" presetClass="entr" presetSubtype="0" fill="hold" nodeType="withEffect">
                                   <p:stCondLst>
                                     <p:cond delay="0"/>
                                   </p:stCondLst>
                                   <p:childTnLst>
                                     <p:set>
                                       <p:cBhvr>
-                                        <p:cTn id="24" dur="1" fill="hold">
+                                        <p:cTn id="30" dur="1" fill="hold">
                                           <p:stCondLst>
                                             <p:cond delay="0"/>
                                           </p:stCondLst>
@@ -18042,14 +18125,49 @@
                                 </p:cTn>
                               </p:par>
                               <p:par>
-                                <p:cTn id="25" presetID="1" presetClass="entr" presetSubtype="0" fill="hold" nodeType="withEffect">
+                                <p:cTn id="31" presetID="10" presetClass="entr" presetSubtype="0" fill="hold" grpId="0" nodeType="withEffect">
                                   <p:stCondLst>
                                     <p:cond delay="0"/>
                                   </p:stCondLst>
                                   <p:childTnLst>
                                     <p:set>
                                       <p:cBhvr>
-                                        <p:cTn id="26" dur="1" fill="hold">
+                                        <p:cTn id="32" dur="1" fill="hold">
+                                          <p:stCondLst>
+                                            <p:cond delay="0"/>
+                                          </p:stCondLst>
+                                        </p:cTn>
+                                        <p:tgtEl>
+                                          <p:spTgt spid="41"/>
+                                        </p:tgtEl>
+                                        <p:attrNameLst>
+                                          <p:attrName>style.visibility</p:attrName>
+                                        </p:attrNameLst>
+                                      </p:cBhvr>
+                                      <p:to>
+                                        <p:strVal val="visible"/>
+                                      </p:to>
+                                    </p:set>
+                                    <p:animEffect transition="in" filter="fade">
+                                      <p:cBhvr>
+                                        <p:cTn id="33" dur="500"/>
+                                        <p:tgtEl>
+                                          <p:spTgt spid="41"/>
+                                        </p:tgtEl>
+                                      </p:cBhvr>
+                                    </p:animEffect>
+                                  </p:childTnLst>
+                                </p:cTn>
+                              </p:par>
+                              <p:par>
+                                <p:cTn id="34" presetID="1" presetClass="entr" presetSubtype="0" fill="hold" nodeType="withEffect">
+                                  <p:stCondLst>
+                                    <p:cond delay="0"/>
+                                  </p:stCondLst>
+                                  <p:childTnLst>
+                                    <p:set>
+                                      <p:cBhvr>
+                                        <p:cTn id="35" dur="1" fill="hold">
                                           <p:stCondLst>
                                             <p:cond delay="0"/>
                                           </p:stCondLst>
@@ -18075,26 +18193,26 @@
                     </p:cTn>
                   </p:par>
                   <p:par>
-                    <p:cTn id="27" fill="hold">
+                    <p:cTn id="36" fill="hold">
                       <p:stCondLst>
                         <p:cond delay="indefinite"/>
                       </p:stCondLst>
                       <p:childTnLst>
                         <p:par>
-                          <p:cTn id="28" fill="hold">
+                          <p:cTn id="37" fill="hold">
                             <p:stCondLst>
                               <p:cond delay="0"/>
                             </p:stCondLst>
                             <p:childTnLst>
                               <p:par>
-                                <p:cTn id="29" presetID="1" presetClass="exit" presetSubtype="0" fill="hold" nodeType="clickEffect">
+                                <p:cTn id="38" presetID="1" presetClass="exit" presetSubtype="0" fill="hold" nodeType="clickEffect">
                                   <p:stCondLst>
                                     <p:cond delay="0"/>
                                   </p:stCondLst>
                                   <p:childTnLst>
                                     <p:set>
                                       <p:cBhvr>
-                                        <p:cTn id="30" dur="1" fill="hold">
+                                        <p:cTn id="39" dur="1" fill="hold">
                                           <p:stCondLst>
                                             <p:cond delay="0"/>
                                           </p:stCondLst>
@@ -18114,14 +18232,14 @@
                                 </p:cTn>
                               </p:par>
                               <p:par>
-                                <p:cTn id="31" presetID="1" presetClass="exit" presetSubtype="0" fill="hold" nodeType="withEffect">
+                                <p:cTn id="40" presetID="1" presetClass="exit" presetSubtype="0" fill="hold" nodeType="withEffect">
                                   <p:stCondLst>
                                     <p:cond delay="0"/>
                                   </p:stCondLst>
                                   <p:childTnLst>
                                     <p:set>
                                       <p:cBhvr>
-                                        <p:cTn id="32" dur="1" fill="hold">
+                                        <p:cTn id="41" dur="1" fill="hold">
                                           <p:stCondLst>
                                             <p:cond delay="0"/>
                                           </p:stCondLst>
@@ -18141,14 +18259,14 @@
                                 </p:cTn>
                               </p:par>
                               <p:par>
-                                <p:cTn id="33" presetID="1" presetClass="entr" presetSubtype="0" fill="hold" nodeType="withEffect">
+                                <p:cTn id="42" presetID="1" presetClass="entr" presetSubtype="0" fill="hold" nodeType="withEffect">
                                   <p:stCondLst>
                                     <p:cond delay="0"/>
                                   </p:stCondLst>
                                   <p:childTnLst>
                                     <p:set>
                                       <p:cBhvr>
-                                        <p:cTn id="34" dur="1" fill="hold">
+                                        <p:cTn id="43" dur="1" fill="hold">
                                           <p:stCondLst>
                                             <p:cond delay="0"/>
                                           </p:stCondLst>
@@ -18168,14 +18286,49 @@
                                 </p:cTn>
                               </p:par>
                               <p:par>
-                                <p:cTn id="35" presetID="1" presetClass="entr" presetSubtype="0" fill="hold" nodeType="withEffect">
+                                <p:cTn id="44" presetID="10" presetClass="entr" presetSubtype="0" fill="hold" grpId="0" nodeType="withEffect">
                                   <p:stCondLst>
                                     <p:cond delay="0"/>
                                   </p:stCondLst>
                                   <p:childTnLst>
                                     <p:set>
                                       <p:cBhvr>
-                                        <p:cTn id="36" dur="1" fill="hold">
+                                        <p:cTn id="45" dur="1" fill="hold">
+                                          <p:stCondLst>
+                                            <p:cond delay="0"/>
+                                          </p:stCondLst>
+                                        </p:cTn>
+                                        <p:tgtEl>
+                                          <p:spTgt spid="43"/>
+                                        </p:tgtEl>
+                                        <p:attrNameLst>
+                                          <p:attrName>style.visibility</p:attrName>
+                                        </p:attrNameLst>
+                                      </p:cBhvr>
+                                      <p:to>
+                                        <p:strVal val="visible"/>
+                                      </p:to>
+                                    </p:set>
+                                    <p:animEffect transition="in" filter="fade">
+                                      <p:cBhvr>
+                                        <p:cTn id="46" dur="500"/>
+                                        <p:tgtEl>
+                                          <p:spTgt spid="43"/>
+                                        </p:tgtEl>
+                                      </p:cBhvr>
+                                    </p:animEffect>
+                                  </p:childTnLst>
+                                </p:cTn>
+                              </p:par>
+                              <p:par>
+                                <p:cTn id="47" presetID="1" presetClass="entr" presetSubtype="0" fill="hold" nodeType="withEffect">
+                                  <p:stCondLst>
+                                    <p:cond delay="0"/>
+                                  </p:stCondLst>
+                                  <p:childTnLst>
+                                    <p:set>
+                                      <p:cBhvr>
+                                        <p:cTn id="48" dur="1" fill="hold">
                                           <p:stCondLst>
                                             <p:cond delay="0"/>
                                           </p:stCondLst>
@@ -18195,14 +18348,14 @@
                                 </p:cTn>
                               </p:par>
                               <p:par>
-                                <p:cTn id="37" presetID="1" presetClass="exit" presetSubtype="0" fill="hold" nodeType="withEffect">
+                                <p:cTn id="49" presetID="1" presetClass="exit" presetSubtype="0" fill="hold" nodeType="withEffect">
                                   <p:stCondLst>
                                     <p:cond delay="0"/>
                                   </p:stCondLst>
                                   <p:childTnLst>
                                     <p:set>
                                       <p:cBhvr>
-                                        <p:cTn id="38" dur="1" fill="hold">
+                                        <p:cTn id="50" dur="1" fill="hold">
                                           <p:stCondLst>
                                             <p:cond delay="0"/>
                                           </p:stCondLst>
@@ -18228,26 +18381,26 @@
                     </p:cTn>
                   </p:par>
                   <p:par>
-                    <p:cTn id="39" fill="hold">
+                    <p:cTn id="51" fill="hold">
                       <p:stCondLst>
                         <p:cond delay="indefinite"/>
                       </p:stCondLst>
                       <p:childTnLst>
                         <p:par>
-                          <p:cTn id="40" fill="hold">
+                          <p:cTn id="52" fill="hold">
                             <p:stCondLst>
                               <p:cond delay="0"/>
                             </p:stCondLst>
                             <p:childTnLst>
                               <p:par>
-                                <p:cTn id="41" presetID="1" presetClass="exit" presetSubtype="0" fill="hold" nodeType="clickEffect">
+                                <p:cTn id="53" presetID="1" presetClass="exit" presetSubtype="0" fill="hold" nodeType="clickEffect">
                                   <p:stCondLst>
                                     <p:cond delay="0"/>
                                   </p:stCondLst>
                                   <p:childTnLst>
                                     <p:set>
                                       <p:cBhvr>
-                                        <p:cTn id="42" dur="1" fill="hold">
+                                        <p:cTn id="54" dur="1" fill="hold">
                                           <p:stCondLst>
                                             <p:cond delay="0"/>
                                           </p:stCondLst>
@@ -18267,14 +18420,14 @@
                                 </p:cTn>
                               </p:par>
                               <p:par>
-                                <p:cTn id="43" presetID="1" presetClass="entr" presetSubtype="0" fill="hold" nodeType="withEffect">
+                                <p:cTn id="55" presetID="1" presetClass="entr" presetSubtype="0" fill="hold" nodeType="withEffect">
                                   <p:stCondLst>
                                     <p:cond delay="0"/>
                                   </p:stCondLst>
                                   <p:childTnLst>
                                     <p:set>
                                       <p:cBhvr>
-                                        <p:cTn id="44" dur="1" fill="hold">
+                                        <p:cTn id="56" dur="1" fill="hold">
                                           <p:stCondLst>
                                             <p:cond delay="0"/>
                                           </p:stCondLst>
@@ -18294,14 +18447,49 @@
                                 </p:cTn>
                               </p:par>
                               <p:par>
-                                <p:cTn id="45" presetID="1" presetClass="entr" presetSubtype="0" fill="hold" nodeType="withEffect">
+                                <p:cTn id="57" presetID="10" presetClass="entr" presetSubtype="0" fill="hold" grpId="0" nodeType="withEffect">
                                   <p:stCondLst>
                                     <p:cond delay="0"/>
                                   </p:stCondLst>
                                   <p:childTnLst>
                                     <p:set>
                                       <p:cBhvr>
-                                        <p:cTn id="46" dur="1" fill="hold">
+                                        <p:cTn id="58" dur="1" fill="hold">
+                                          <p:stCondLst>
+                                            <p:cond delay="0"/>
+                                          </p:stCondLst>
+                                        </p:cTn>
+                                        <p:tgtEl>
+                                          <p:spTgt spid="44"/>
+                                        </p:tgtEl>
+                                        <p:attrNameLst>
+                                          <p:attrName>style.visibility</p:attrName>
+                                        </p:attrNameLst>
+                                      </p:cBhvr>
+                                      <p:to>
+                                        <p:strVal val="visible"/>
+                                      </p:to>
+                                    </p:set>
+                                    <p:animEffect transition="in" filter="fade">
+                                      <p:cBhvr>
+                                        <p:cTn id="59" dur="500"/>
+                                        <p:tgtEl>
+                                          <p:spTgt spid="44"/>
+                                        </p:tgtEl>
+                                      </p:cBhvr>
+                                    </p:animEffect>
+                                  </p:childTnLst>
+                                </p:cTn>
+                              </p:par>
+                              <p:par>
+                                <p:cTn id="60" presetID="1" presetClass="entr" presetSubtype="0" fill="hold" nodeType="withEffect">
+                                  <p:stCondLst>
+                                    <p:cond delay="0"/>
+                                  </p:stCondLst>
+                                  <p:childTnLst>
+                                    <p:set>
+                                      <p:cBhvr>
+                                        <p:cTn id="61" dur="1" fill="hold">
                                           <p:stCondLst>
                                             <p:cond delay="0"/>
                                           </p:stCondLst>
@@ -18321,14 +18509,14 @@
                                 </p:cTn>
                               </p:par>
                               <p:par>
-                                <p:cTn id="47" presetID="1" presetClass="exit" presetSubtype="0" fill="hold" nodeType="withEffect">
+                                <p:cTn id="62" presetID="1" presetClass="exit" presetSubtype="0" fill="hold" nodeType="withEffect">
                                   <p:stCondLst>
                                     <p:cond delay="0"/>
                                   </p:stCondLst>
                                   <p:childTnLst>
                                     <p:set>
                                       <p:cBhvr>
-                                        <p:cTn id="48" dur="1" fill="hold">
+                                        <p:cTn id="63" dur="1" fill="hold">
                                           <p:stCondLst>
                                             <p:cond delay="0"/>
                                           </p:stCondLst>
@@ -18374,6 +18562,13 @@
         </p:cTn>
       </p:par>
     </p:tnLst>
+    <p:bldLst>
+      <p:bldP spid="38" grpId="0"/>
+      <p:bldP spid="40" grpId="0"/>
+      <p:bldP spid="41" grpId="0"/>
+      <p:bldP spid="43" grpId="0"/>
+      <p:bldP spid="44" grpId="0"/>
+    </p:bldLst>
   </p:timing>
 </p:sld>
 </file>
@@ -18470,7 +18665,7 @@
                 <a:tabLst/>
                 <a:defRPr/>
               </a:pPr>
-              <a:t>17.05.2022</a:t>
+              <a:t>18.05.2022</a:t>
             </a:fld>
             <a:endParaRPr kumimoji="0" lang="de-DE" sz="900" b="0" i="0" u="none" strike="noStrike" kern="1200" cap="none" spc="0" normalizeH="0" baseline="0" noProof="0" dirty="0">
               <a:ln>
@@ -19342,7 +19537,7 @@
                 <a:tabLst/>
                 <a:defRPr/>
               </a:pPr>
-              <a:t>17.05.2022</a:t>
+              <a:t>18.05.2022</a:t>
             </a:fld>
             <a:endParaRPr kumimoji="0" lang="de-DE" sz="900" b="0" i="0" u="none" strike="noStrike" kern="1200" cap="none" spc="0" normalizeH="0" baseline="0" noProof="0" dirty="0">
               <a:ln>
@@ -20322,7 +20517,7 @@
                 <a:tabLst/>
                 <a:defRPr/>
               </a:pPr>
-              <a:t>17.05.2022</a:t>
+              <a:t>18.05.2022</a:t>
             </a:fld>
             <a:endParaRPr kumimoji="0" lang="de-DE" sz="900" b="0" i="0" u="none" strike="noStrike" kern="1200" cap="none" spc="0" normalizeH="0" baseline="0" noProof="0" dirty="0">
               <a:ln>
@@ -21166,7 +21361,7 @@
           <a:p>
             <a:fld id="{4E4D35B4-7069-4B30-92CD-0AEC62722384}" type="datetime1">
               <a:rPr lang="de-DE" smtClean="0"/>
-              <a:t>17.05.2022</a:t>
+              <a:t>18.05.2022</a:t>
             </a:fld>
             <a:endParaRPr lang="de-DE" dirty="0"/>
           </a:p>
@@ -21366,7 +21561,7 @@
                 <a:tabLst/>
                 <a:defRPr/>
               </a:pPr>
-              <a:t>17.05.2022</a:t>
+              <a:t>18.05.2022</a:t>
             </a:fld>
             <a:endParaRPr kumimoji="0" lang="de-DE" sz="900" b="0" i="0" u="none" strike="noStrike" kern="1200" cap="none" spc="0" normalizeH="0" baseline="0" noProof="0" dirty="0">
               <a:ln>
@@ -22655,7 +22850,7 @@
                   <a:srgbClr val="2E4186"/>
                 </a:solidFill>
               </a:rPr>
-              <a:t>17.05.2022</a:t>
+              <a:t>18.05.2022</a:t>
             </a:fld>
             <a:endParaRPr lang="de-DE" dirty="0">
               <a:solidFill>
@@ -23821,7 +24016,7 @@
                   <a:srgbClr val="2E4186"/>
                 </a:solidFill>
               </a:rPr>
-              <a:t>17.05.2022</a:t>
+              <a:t>18.05.2022</a:t>
             </a:fld>
             <a:endParaRPr lang="de-DE" dirty="0">
               <a:solidFill>
@@ -25062,7 +25257,7 @@
                   <a:srgbClr val="2E4186"/>
                 </a:solidFill>
               </a:rPr>
-              <a:t>17.05.2022</a:t>
+              <a:t>18.05.2022</a:t>
             </a:fld>
             <a:endParaRPr lang="de-DE" dirty="0">
               <a:solidFill>
@@ -25647,7 +25842,7 @@
                   <a:srgbClr val="2E4186"/>
                 </a:solidFill>
               </a:rPr>
-              <a:t>17.05.2022</a:t>
+              <a:t>18.05.2022</a:t>
             </a:fld>
             <a:endParaRPr lang="de-DE" dirty="0">
               <a:solidFill>
@@ -26816,7 +27011,7 @@
                   <a:srgbClr val="2E4186"/>
                 </a:solidFill>
               </a:rPr>
-              <a:t>17.05.2022</a:t>
+              <a:t>18.05.2022</a:t>
             </a:fld>
             <a:endParaRPr lang="de-DE" dirty="0">
               <a:solidFill>
@@ -27657,7 +27852,7 @@
                   <a:srgbClr val="2E4186"/>
                 </a:solidFill>
               </a:rPr>
-              <a:t>17.05.2022</a:t>
+              <a:t>18.05.2022</a:t>
             </a:fld>
             <a:endParaRPr lang="de-DE" dirty="0">
               <a:solidFill>
@@ -29195,7 +29390,7 @@
                   <a:srgbClr val="2E4186"/>
                 </a:solidFill>
               </a:rPr>
-              <a:t>17.05.2022</a:t>
+              <a:t>18.05.2022</a:t>
             </a:fld>
             <a:endParaRPr lang="de-DE" dirty="0">
               <a:solidFill>

</xml_diff>